<commit_message>
Final modifications for reformatting
</commit_message>
<xml_diff>
--- a/Slides/MiCM_IntroToR.pptx
+++ b/Slides/MiCM_IntroToR.pptx
@@ -6149,13 +6149,21 @@
             </a:pPr>
             <a:r>
               <a:rPr lang="en-CA" sz="2400" b="1" dirty="0"/>
-              <a:t>Go to </a:t>
-            </a:r>
-            <a:r>
-              <a:rPr lang="en-CA" sz="2400" b="1" dirty="0">
+              <a:t>Go </a:t>
+            </a:r>
+            <a:r>
+              <a:rPr lang="en-CA" sz="2400" b="1"/>
+              <a:t>to </a:t>
+            </a:r>
+            <a:r>
+              <a:rPr lang="en-CA" sz="2400" b="1">
                 <a:hlinkClick r:id="rId2"/>
               </a:rPr>
-              <a:t>https://github.com/aosakwe/MiCM_IntroToRProgramming</a:t>
+              <a:t>https://github.com/QLS-MiCM/IntroToR</a:t>
+            </a:r>
+            <a:r>
+              <a:rPr lang="en-CA" sz="2400" b="1"/>
+              <a:t> </a:t>
             </a:r>
             <a:endParaRPr lang="en-CA" sz="2400" b="1" dirty="0"/>
           </a:p>

</xml_diff>

<commit_message>
update slides, readme, and several pages small details
- update instructor names on the slides
- update workshop agenda
- NEEDED TO UPDATE WORKSHOP QR CODE [unfinished]
- update readme with martina github link [will update later]
</commit_message>
<xml_diff>
--- a/Slides/MiCM_IntroToR.pptx
+++ b/Slides/MiCM_IntroToR.pptx
@@ -2414,7 +2414,7 @@
           <a:p>
             <a:fld id="{217E5156-1B5D-054E-B5B2-E1B1BA160252}" type="datetimeFigureOut">
               <a:rPr lang="fr-FR" smtClean="0"/>
-              <a:t>11/07/2025</a:t>
+              <a:t>04/02/2026</a:t>
             </a:fld>
             <a:endParaRPr lang="fr-FR"/>
           </a:p>
@@ -6149,23 +6149,18 @@
             </a:pPr>
             <a:r>
               <a:rPr lang="en-CA" sz="2400" b="1" dirty="0"/>
-              <a:t>Go </a:t>
-            </a:r>
-            <a:r>
-              <a:rPr lang="en-CA" sz="2400" b="1"/>
-              <a:t>to </a:t>
-            </a:r>
-            <a:r>
-              <a:rPr lang="en-CA" sz="2400" b="1">
+              <a:t>Go to </a:t>
+            </a:r>
+            <a:r>
+              <a:rPr lang="en-CA" sz="2400" b="1" dirty="0">
                 <a:hlinkClick r:id="rId2"/>
               </a:rPr>
               <a:t>https://github.com/QLS-MiCM/IntroToR</a:t>
             </a:r>
             <a:r>
-              <a:rPr lang="en-CA" sz="2400" b="1"/>
+              <a:rPr lang="en-CA" sz="2400" b="1" dirty="0"/>
               <a:t> </a:t>
             </a:r>
-            <a:endParaRPr lang="en-CA" sz="2400" b="1" dirty="0"/>
           </a:p>
           <a:p>
             <a:pPr marL="457200" indent="-457200">
@@ -11506,7 +11501,7 @@
                   <a:srgbClr val="69B0A0"/>
                 </a:solidFill>
               </a:rPr>
-              <a:t>Lead: Maximiliane Jousse</a:t>
+              <a:t>Lead: Martina Yang</a:t>
             </a:r>
             <a:br>
               <a:rPr lang="en-US" sz="3100" b="1" dirty="0">
@@ -11521,7 +11516,7 @@
                   <a:srgbClr val="69B0A0"/>
                 </a:solidFill>
               </a:rPr>
-              <a:t>Facilitator: Sana Naderi</a:t>
+              <a:t>Facilitator: Maria Haddad</a:t>
             </a:r>
             <a:br>
               <a:rPr lang="en-CA" sz="6600" dirty="0">
@@ -11535,22 +11530,14 @@
             </a:br>
             <a:r>
               <a:rPr lang="en-CA" sz="2200" dirty="0"/>
-              <a:t>July 14, 2025</a:t>
+              <a:t>Feb 9, 2026</a:t>
             </a:r>
             <a:br>
               <a:rPr lang="en-CA" sz="2200" dirty="0"/>
             </a:br>
             <a:r>
               <a:rPr lang="en-CA" sz="2200" dirty="0"/>
-              <a:t>Materials adapted from Larisa M. Soto and </a:t>
-            </a:r>
-            <a:r>
-              <a:rPr lang="en-CA" sz="2200" dirty="0" err="1"/>
-              <a:t>Xiaoqi</a:t>
-            </a:r>
-            <a:r>
-              <a:rPr lang="en-CA" sz="2200" dirty="0"/>
-              <a:t> Xie</a:t>
+              <a:t>Materials adapted from Adrien Osakwe,  Larisa M. Soto and Xiaoqi Xie.</a:t>
             </a:r>
             <a:endParaRPr lang="en-US" sz="2200" dirty="0">
               <a:solidFill>
@@ -16745,57 +16732,6 @@
           </a:p>
         </p:txBody>
       </p:sp>
-      <p:sp>
-        <p:nvSpPr>
-          <p:cNvPr id="6" name="Rectangle 5">
-            <a:extLst>
-              <a:ext uri="{FF2B5EF4-FFF2-40B4-BE49-F238E27FC236}">
-                <a16:creationId xmlns:a16="http://schemas.microsoft.com/office/drawing/2014/main" id="{573637BB-7408-0828-6BB1-1D8D6339B867}"/>
-              </a:ext>
-            </a:extLst>
-          </p:cNvPr>
-          <p:cNvSpPr/>
-          <p:nvPr/>
-        </p:nvSpPr>
-        <p:spPr>
-          <a:xfrm>
-            <a:off x="7634602" y="3643922"/>
-            <a:ext cx="175282" cy="1440141"/>
-          </a:xfrm>
-          <a:prstGeom prst="rect">
-            <a:avLst/>
-          </a:prstGeom>
-          <a:ln>
-            <a:solidFill>
-              <a:schemeClr val="accent3"/>
-            </a:solidFill>
-          </a:ln>
-        </p:spPr>
-        <p:style>
-          <a:lnRef idx="2">
-            <a:schemeClr val="accent3">
-              <a:shade val="15000"/>
-            </a:schemeClr>
-          </a:lnRef>
-          <a:fillRef idx="1">
-            <a:schemeClr val="accent3"/>
-          </a:fillRef>
-          <a:effectRef idx="0">
-            <a:schemeClr val="accent3"/>
-          </a:effectRef>
-          <a:fontRef idx="minor">
-            <a:schemeClr val="lt1"/>
-          </a:fontRef>
-        </p:style>
-        <p:txBody>
-          <a:bodyPr rtlCol="0" anchor="ctr"/>
-          <a:lstStyle/>
-          <a:p>
-            <a:pPr algn="ctr"/>
-            <a:endParaRPr lang="en-US"/>
-          </a:p>
-        </p:txBody>
-      </p:sp>
       <p:pic>
         <p:nvPicPr>
           <p:cNvPr id="3" name="Picture 2">
@@ -16812,14 +16748,13 @@
         </p:nvPicPr>
         <p:blipFill>
           <a:blip r:embed="rId3"/>
-          <a:stretch>
-            <a:fillRect/>
-          </a:stretch>
+          <a:srcRect/>
+          <a:stretch/>
         </p:blipFill>
         <p:spPr>
           <a:xfrm>
-            <a:off x="745309" y="1677459"/>
-            <a:ext cx="7653382" cy="3503081"/>
+            <a:off x="745309" y="2169959"/>
+            <a:ext cx="7653382" cy="2518081"/>
           </a:xfrm>
           <a:prstGeom prst="rect">
             <a:avLst/>
@@ -19932,18 +19867,14 @@
           </a:p>
           <a:p>
             <a:r>
-              <a:rPr lang="en-CA"/>
+              <a:rPr lang="en-CA" dirty="0"/>
               <a:t>Regression</a:t>
             </a:r>
           </a:p>
           <a:p>
             <a:r>
-              <a:rPr lang="en-CA"/>
-              <a:t>Statistical </a:t>
-            </a:r>
-            <a:r>
               <a:rPr lang="en-CA" dirty="0"/>
-              <a:t>Analysis</a:t>
+              <a:t>Statistical Analysis</a:t>
             </a:r>
           </a:p>
           <a:p>
@@ -19951,36 +19882,47 @@
           </a:p>
         </p:txBody>
       </p:sp>
-      <p:pic>
-        <p:nvPicPr>
-          <p:cNvPr id="4" name="Picture 3">
+      <p:sp>
+        <p:nvSpPr>
+          <p:cNvPr id="5" name="TextBox 4">
             <a:extLst>
               <a:ext uri="{FF2B5EF4-FFF2-40B4-BE49-F238E27FC236}">
-                <a16:creationId xmlns:a16="http://schemas.microsoft.com/office/drawing/2014/main" id="{FFD733B6-352A-B23F-E203-324034C168DC}"/>
+                <a16:creationId xmlns:a16="http://schemas.microsoft.com/office/drawing/2014/main" id="{96D2A1A3-3EE6-123C-1FA2-BB2C4F4AC141}"/>
               </a:ext>
             </a:extLst>
           </p:cNvPr>
-          <p:cNvPicPr>
-            <a:picLocks noChangeAspect="1"/>
-          </p:cNvPicPr>
+          <p:cNvSpPr txBox="1"/>
           <p:nvPr/>
-        </p:nvPicPr>
-        <p:blipFill>
-          <a:blip r:embed="rId2"/>
-          <a:stretch>
-            <a:fillRect/>
-          </a:stretch>
-        </p:blipFill>
+        </p:nvSpPr>
         <p:spPr>
           <a:xfrm>
-            <a:off x="242628" y="4847655"/>
-            <a:ext cx="8658743" cy="368188"/>
+            <a:off x="1750395" y="5222976"/>
+            <a:ext cx="5643210" cy="369460"/>
           </a:xfrm>
           <a:prstGeom prst="rect">
             <a:avLst/>
           </a:prstGeom>
+          <a:noFill/>
         </p:spPr>
-      </p:pic>
+        <p:txBody>
+          <a:bodyPr wrap="square">
+            <a:spAutoFit/>
+          </a:bodyPr>
+          <a:lstStyle/>
+          <a:p>
+            <a:r>
+              <a:rPr lang="en-US" dirty="0">
+                <a:latin typeface="Helvetica" pitchFamily="2" charset="0"/>
+                <a:hlinkClick r:id="rId2"/>
+              </a:rPr>
+              <a:t>https://www.mcgill.ca/micm/training/workshops-series</a:t>
+            </a:r>
+            <a:endParaRPr lang="en-US" dirty="0">
+              <a:latin typeface="Helvetica" pitchFamily="2" charset="0"/>
+            </a:endParaRPr>
+          </a:p>
+        </p:txBody>
+      </p:sp>
     </p:spTree>
     <p:extLst>
       <p:ext uri="{BB962C8B-B14F-4D97-AF65-F5344CB8AC3E}">

</xml_diff>